<commit_message>
Create Git e Github - Apresentação.pptx
</commit_message>
<xml_diff>
--- a/Apresentação PowerPoint/Git e Github - Apresentação.pptx
+++ b/Apresentação PowerPoint/Git e Github - Apresentação.pptx
@@ -154,6 +154,9 @@
         </p14:section>
       </p14:sectionLst>
     </p:ext>
+    <p:ext uri="{EFAFB233-063F-42B5-8137-9DF3F51BA10A}">
+      <p15:sldGuideLst xmlns:p15="http://schemas.microsoft.com/office/powerpoint/2012/main"/>
+    </p:ext>
   </p:extLst>
 </p:presentation>
 </file>
@@ -297,7 +300,7 @@
           <a:p>
             <a:fld id="{48A87A34-81AB-432B-8DAE-1953F412C126}" type="datetimeFigureOut">
               <a:rPr lang="en-US" dirty="0"/>
-              <a:t>5/5/2020</a:t>
+              <a:t>5/6/2020</a:t>
             </a:fld>
             <a:endParaRPr lang="en-US" dirty="0"/>
           </a:p>
@@ -503,7 +506,7 @@
           <a:p>
             <a:fld id="{48A87A34-81AB-432B-8DAE-1953F412C126}" type="datetimeFigureOut">
               <a:rPr lang="en-US" dirty="0"/>
-              <a:t>5/5/2020</a:t>
+              <a:t>5/6/2020</a:t>
             </a:fld>
             <a:endParaRPr lang="en-US" dirty="0"/>
           </a:p>
@@ -713,7 +716,7 @@
           <a:p>
             <a:fld id="{48A87A34-81AB-432B-8DAE-1953F412C126}" type="datetimeFigureOut">
               <a:rPr lang="en-US" dirty="0"/>
-              <a:t>5/5/2020</a:t>
+              <a:t>5/6/2020</a:t>
             </a:fld>
             <a:endParaRPr lang="en-US" dirty="0"/>
           </a:p>
@@ -909,7 +912,7 @@
           <a:p>
             <a:fld id="{48A87A34-81AB-432B-8DAE-1953F412C126}" type="datetimeFigureOut">
               <a:rPr lang="en-US" dirty="0"/>
-              <a:t>5/5/2020</a:t>
+              <a:t>5/6/2020</a:t>
             </a:fld>
             <a:endParaRPr lang="en-US" dirty="0"/>
           </a:p>
@@ -1183,7 +1186,7 @@
           <a:p>
             <a:fld id="{48A87A34-81AB-432B-8DAE-1953F412C126}" type="datetimeFigureOut">
               <a:rPr lang="en-US" dirty="0"/>
-              <a:t>5/5/2020</a:t>
+              <a:t>5/6/2020</a:t>
             </a:fld>
             <a:endParaRPr lang="en-US" dirty="0"/>
           </a:p>
@@ -1446,7 +1449,7 @@
           <a:p>
             <a:fld id="{48A87A34-81AB-432B-8DAE-1953F412C126}" type="datetimeFigureOut">
               <a:rPr lang="en-US" dirty="0"/>
-              <a:t>5/5/2020</a:t>
+              <a:t>5/6/2020</a:t>
             </a:fld>
             <a:endParaRPr lang="en-US" dirty="0"/>
           </a:p>
@@ -1857,7 +1860,7 @@
           <a:p>
             <a:fld id="{48A87A34-81AB-432B-8DAE-1953F412C126}" type="datetimeFigureOut">
               <a:rPr lang="en-US" dirty="0"/>
-              <a:t>5/5/2020</a:t>
+              <a:t>5/6/2020</a:t>
             </a:fld>
             <a:endParaRPr lang="en-US" dirty="0"/>
           </a:p>
@@ -2001,7 +2004,7 @@
           <a:p>
             <a:fld id="{48A87A34-81AB-432B-8DAE-1953F412C126}" type="datetimeFigureOut">
               <a:rPr lang="en-US" dirty="0"/>
-              <a:t>5/5/2020</a:t>
+              <a:t>5/6/2020</a:t>
             </a:fld>
             <a:endParaRPr lang="en-US" dirty="0"/>
           </a:p>
@@ -2122,7 +2125,7 @@
           <a:p>
             <a:fld id="{48A87A34-81AB-432B-8DAE-1953F412C126}" type="datetimeFigureOut">
               <a:rPr lang="en-US" dirty="0"/>
-              <a:t>5/5/2020</a:t>
+              <a:t>5/6/2020</a:t>
             </a:fld>
             <a:endParaRPr lang="en-US" dirty="0"/>
           </a:p>
@@ -2368,7 +2371,7 @@
           <a:p>
             <a:fld id="{48A87A34-81AB-432B-8DAE-1953F412C126}" type="datetimeFigureOut">
               <a:rPr lang="en-US" dirty="0"/>
-              <a:t>5/5/2020</a:t>
+              <a:t>5/6/2020</a:t>
             </a:fld>
             <a:endParaRPr lang="en-US" dirty="0"/>
           </a:p>
@@ -2809,7 +2812,7 @@
             <a:fld id="{48A87A34-81AB-432B-8DAE-1953F412C126}" type="datetimeFigureOut">
               <a:rPr lang="en-US" dirty="0"/>
               <a:pPr/>
-              <a:t>5/5/2020</a:t>
+              <a:t>5/6/2020</a:t>
             </a:fld>
             <a:endParaRPr lang="en-US" dirty="0"/>
           </a:p>
@@ -3132,7 +3135,7 @@
             <a:fld id="{48A87A34-81AB-432B-8DAE-1953F412C126}" type="datetimeFigureOut">
               <a:rPr lang="en-US" dirty="0"/>
               <a:pPr/>
-              <a:t>5/5/2020</a:t>
+              <a:t>5/6/2020</a:t>
             </a:fld>
             <a:endParaRPr lang="en-US" dirty="0"/>
           </a:p>
@@ -4706,6 +4709,12 @@
               <a:t>GitHub Desktop;</a:t>
             </a:r>
           </a:p>
+          <a:p>
+            <a:r>
+              <a:rPr lang="pt-BR" dirty="0"/>
+              <a:t>Trabalho Colaborativo;</a:t>
+            </a:r>
+          </a:p>
         </p:txBody>
       </p:sp>
       <p:sp>

</xml_diff>

<commit_message>
Update Git e Github - Apresentação.pptx
</commit_message>
<xml_diff>
--- a/Apresentação PowerPoint/Git e Github - Apresentação.pptx
+++ b/Apresentação PowerPoint/Git e Github - Apresentação.pptx
@@ -4555,7 +4555,7 @@
           <a:p>
             <a:r>
               <a:rPr lang="pt-BR" dirty="0"/>
-              <a:t>Comunicação entre o repsitório local e o repositório remoto;</a:t>
+              <a:t>Comunicação entre o repositório local e o repositório remoto;</a:t>
             </a:r>
           </a:p>
           <a:p>
@@ -4688,7 +4688,7 @@
           <a:p>
             <a:r>
               <a:rPr lang="pt-BR" dirty="0"/>
-              <a:t>Rede Social para programadores;</a:t>
+              <a:t>Rede Social para desenvolvedores;</a:t>
             </a:r>
           </a:p>
           <a:p>

</xml_diff>